<commit_message>
Fit DFE with updated parameters
</commit_message>
<xml_diff>
--- a/Summary/figures.pptx
+++ b/Summary/figures.pptx
@@ -5,7 +5,7 @@
     <p:sldMasterId id="2147483660" r:id="rId1"/>
   </p:sldMasterIdLst>
   <p:notesMasterIdLst>
-    <p:notesMasterId r:id="rId13"/>
+    <p:notesMasterId r:id="rId14"/>
   </p:notesMasterIdLst>
   <p:sldIdLst>
     <p:sldId id="420" r:id="rId2"/>
@@ -19,6 +19,7 @@
     <p:sldId id="415" r:id="rId10"/>
     <p:sldId id="416" r:id="rId11"/>
     <p:sldId id="426" r:id="rId12"/>
+    <p:sldId id="429" r:id="rId13"/>
   </p:sldIdLst>
   <p:sldSz cx="18288000" cy="18288000"/>
   <p:notesSz cx="6858000" cy="9144000"/>
@@ -128,7 +129,7 @@
 <file path=ppt/revisionInfo.xml><?xml version="1.0" encoding="utf-8"?>
 <p1510:revInfo xmlns:a="http://schemas.openxmlformats.org/drawingml/2006/main" xmlns:r="http://schemas.openxmlformats.org/officeDocument/2006/relationships" xmlns:p1510="http://schemas.microsoft.com/office/powerpoint/2015/10/main">
   <p1510:revLst>
-    <p1510:client id="{833092D5-9927-4807-BE3E-672C10A7E002}" v="109" dt="2023-07-05T18:28:07.325"/>
+    <p1510:client id="{833092D5-9927-4807-BE3E-672C10A7E002}" v="123" dt="2023-07-19T19:50:59.504"/>
   </p1510:revLst>
 </p1510:revInfo>
 </file>
@@ -178,7 +179,7 @@
   <pc:docChgLst>
     <pc:chgData name="Jonathan Mah" userId="5261b2f2f3e51194" providerId="LiveId" clId="{833092D5-9927-4807-BE3E-672C10A7E002}"/>
     <pc:docChg chg="undo redo custSel addSld delSld modSld sldOrd">
-      <pc:chgData name="Jonathan Mah" userId="5261b2f2f3e51194" providerId="LiveId" clId="{833092D5-9927-4807-BE3E-672C10A7E002}" dt="2023-07-05T18:28:09.459" v="1976" actId="167"/>
+      <pc:chgData name="Jonathan Mah" userId="5261b2f2f3e51194" providerId="LiveId" clId="{833092D5-9927-4807-BE3E-672C10A7E002}" dt="2023-07-19T19:51:51.366" v="2277" actId="14100"/>
       <pc:docMkLst>
         <pc:docMk/>
       </pc:docMkLst>
@@ -4660,6 +4661,188 @@
             <pc:docMk/>
             <pc:sldMk cId="652272095" sldId="426"/>
             <ac:picMk id="15" creationId="{2DA3E69C-931C-A35D-9A5C-43B3CCDCA69C}"/>
+          </ac:picMkLst>
+        </pc:picChg>
+      </pc:sldChg>
+      <pc:sldChg chg="addSp delSp modSp new del mod">
+        <pc:chgData name="Jonathan Mah" userId="5261b2f2f3e51194" providerId="LiveId" clId="{833092D5-9927-4807-BE3E-672C10A7E002}" dt="2023-07-14T22:34:04.122" v="1982" actId="47"/>
+        <pc:sldMkLst>
+          <pc:docMk/>
+          <pc:sldMk cId="2571562739" sldId="428"/>
+        </pc:sldMkLst>
+        <pc:spChg chg="del">
+          <ac:chgData name="Jonathan Mah" userId="5261b2f2f3e51194" providerId="LiveId" clId="{833092D5-9927-4807-BE3E-672C10A7E002}" dt="2023-07-14T22:33:49.121" v="1978" actId="478"/>
+          <ac:spMkLst>
+            <pc:docMk/>
+            <pc:sldMk cId="2571562739" sldId="428"/>
+            <ac:spMk id="2" creationId="{306A2AD6-D3E1-BE5A-97BA-91581B32AE02}"/>
+          </ac:spMkLst>
+        </pc:spChg>
+        <pc:spChg chg="del">
+          <ac:chgData name="Jonathan Mah" userId="5261b2f2f3e51194" providerId="LiveId" clId="{833092D5-9927-4807-BE3E-672C10A7E002}" dt="2023-07-14T22:33:49.121" v="1978" actId="478"/>
+          <ac:spMkLst>
+            <pc:docMk/>
+            <pc:sldMk cId="2571562739" sldId="428"/>
+            <ac:spMk id="3" creationId="{43967E6C-B304-891C-1B74-7ED3B7E659BB}"/>
+          </ac:spMkLst>
+        </pc:spChg>
+        <pc:picChg chg="add mod">
+          <ac:chgData name="Jonathan Mah" userId="5261b2f2f3e51194" providerId="LiveId" clId="{833092D5-9927-4807-BE3E-672C10A7E002}" dt="2023-07-14T22:33:51.036" v="1980" actId="1076"/>
+          <ac:picMkLst>
+            <pc:docMk/>
+            <pc:sldMk cId="2571562739" sldId="428"/>
+            <ac:picMk id="4" creationId="{E9D938AB-F1CE-2428-CBFC-5A9A6E46C81D}"/>
+          </ac:picMkLst>
+        </pc:picChg>
+      </pc:sldChg>
+      <pc:sldChg chg="addSp delSp modSp add mod">
+        <pc:chgData name="Jonathan Mah" userId="5261b2f2f3e51194" providerId="LiveId" clId="{833092D5-9927-4807-BE3E-672C10A7E002}" dt="2023-07-19T19:51:51.366" v="2277" actId="14100"/>
+        <pc:sldMkLst>
+          <pc:docMk/>
+          <pc:sldMk cId="3765396124" sldId="429"/>
+        </pc:sldMkLst>
+        <pc:spChg chg="add del">
+          <ac:chgData name="Jonathan Mah" userId="5261b2f2f3e51194" providerId="LiveId" clId="{833092D5-9927-4807-BE3E-672C10A7E002}" dt="2023-07-19T19:50:59.491" v="2268"/>
+          <ac:spMkLst>
+            <pc:docMk/>
+            <pc:sldMk cId="3765396124" sldId="429"/>
+            <ac:spMk id="2" creationId="{B03ED20E-ECCE-C93D-0211-AB805AF91CD3}"/>
+          </ac:spMkLst>
+        </pc:spChg>
+        <pc:spChg chg="add del">
+          <ac:chgData name="Jonathan Mah" userId="5261b2f2f3e51194" providerId="LiveId" clId="{833092D5-9927-4807-BE3E-672C10A7E002}" dt="2023-07-14T22:39:28.204" v="1993"/>
+          <ac:spMkLst>
+            <pc:docMk/>
+            <pc:sldMk cId="3765396124" sldId="429"/>
+            <ac:spMk id="2" creationId="{E61DDE4C-1D7C-C0D8-59D1-48EBFCB75C3A}"/>
+          </ac:spMkLst>
+        </pc:spChg>
+        <pc:spChg chg="del">
+          <ac:chgData name="Jonathan Mah" userId="5261b2f2f3e51194" providerId="LiveId" clId="{833092D5-9927-4807-BE3E-672C10A7E002}" dt="2023-07-14T22:34:07.435" v="1984" actId="478"/>
+          <ac:spMkLst>
+            <pc:docMk/>
+            <pc:sldMk cId="3765396124" sldId="429"/>
+            <ac:spMk id="12" creationId="{3FAD5785-2EBE-157C-4958-55580125D829}"/>
+          </ac:spMkLst>
+        </pc:spChg>
+        <pc:spChg chg="del">
+          <ac:chgData name="Jonathan Mah" userId="5261b2f2f3e51194" providerId="LiveId" clId="{833092D5-9927-4807-BE3E-672C10A7E002}" dt="2023-07-14T22:34:09.170" v="1985" actId="478"/>
+          <ac:spMkLst>
+            <pc:docMk/>
+            <pc:sldMk cId="3765396124" sldId="429"/>
+            <ac:spMk id="13" creationId="{88B18BE0-5F6B-4C31-2D55-F550CE61E7FB}"/>
+          </ac:spMkLst>
+        </pc:spChg>
+        <pc:spChg chg="del">
+          <ac:chgData name="Jonathan Mah" userId="5261b2f2f3e51194" providerId="LiveId" clId="{833092D5-9927-4807-BE3E-672C10A7E002}" dt="2023-07-14T22:34:14.445" v="1989" actId="478"/>
+          <ac:spMkLst>
+            <pc:docMk/>
+            <pc:sldMk cId="3765396124" sldId="429"/>
+            <ac:spMk id="14" creationId="{2CADF09D-57B3-ACE1-9674-1B704060D8DF}"/>
+          </ac:spMkLst>
+        </pc:spChg>
+        <pc:spChg chg="add mod">
+          <ac:chgData name="Jonathan Mah" userId="5261b2f2f3e51194" providerId="LiveId" clId="{833092D5-9927-4807-BE3E-672C10A7E002}" dt="2023-07-14T22:51:27.042" v="2263" actId="14100"/>
+          <ac:spMkLst>
+            <pc:docMk/>
+            <pc:sldMk cId="3765396124" sldId="429"/>
+            <ac:spMk id="17" creationId="{CA956D0F-F840-901A-8FCC-83072C36A26C}"/>
+          </ac:spMkLst>
+        </pc:spChg>
+        <pc:picChg chg="mod modCrop">
+          <ac:chgData name="Jonathan Mah" userId="5261b2f2f3e51194" providerId="LiveId" clId="{833092D5-9927-4807-BE3E-672C10A7E002}" dt="2023-07-19T19:51:51.366" v="2277" actId="14100"/>
+          <ac:picMkLst>
+            <pc:docMk/>
+            <pc:sldMk cId="3765396124" sldId="429"/>
+            <ac:picMk id="3" creationId="{1C88653A-C506-B445-4F6E-1CD84D2FD5F3}"/>
+          </ac:picMkLst>
+        </pc:picChg>
+        <pc:picChg chg="del mod">
+          <ac:chgData name="Jonathan Mah" userId="5261b2f2f3e51194" providerId="LiveId" clId="{833092D5-9927-4807-BE3E-672C10A7E002}" dt="2023-07-19T19:51:09.031" v="2272" actId="478"/>
+          <ac:picMkLst>
+            <pc:docMk/>
+            <pc:sldMk cId="3765396124" sldId="429"/>
+            <ac:picMk id="4" creationId="{B4AA63D1-8ED5-E707-690E-2E1E3BBDAF5D}"/>
+          </ac:picMkLst>
+        </pc:picChg>
+        <pc:picChg chg="del">
+          <ac:chgData name="Jonathan Mah" userId="5261b2f2f3e51194" providerId="LiveId" clId="{833092D5-9927-4807-BE3E-672C10A7E002}" dt="2023-07-14T22:34:10.891" v="1987" actId="478"/>
+          <ac:picMkLst>
+            <pc:docMk/>
+            <pc:sldMk cId="3765396124" sldId="429"/>
+            <ac:picMk id="5" creationId="{4E164DF8-57D8-0F85-F258-8A91CE9899F8}"/>
+          </ac:picMkLst>
+        </pc:picChg>
+        <pc:picChg chg="add mod">
+          <ac:chgData name="Jonathan Mah" userId="5261b2f2f3e51194" providerId="LiveId" clId="{833092D5-9927-4807-BE3E-672C10A7E002}" dt="2023-07-19T19:51:13.836" v="2273" actId="1076"/>
+          <ac:picMkLst>
+            <pc:docMk/>
+            <pc:sldMk cId="3765396124" sldId="429"/>
+            <ac:picMk id="5" creationId="{DF3CF68F-65E3-018A-CE7F-3D7703037ABA}"/>
+          </ac:picMkLst>
+        </pc:picChg>
+        <pc:picChg chg="add del mod">
+          <ac:chgData name="Jonathan Mah" userId="5261b2f2f3e51194" providerId="LiveId" clId="{833092D5-9927-4807-BE3E-672C10A7E002}" dt="2023-07-19T19:50:56.638" v="2264" actId="478"/>
+          <ac:picMkLst>
+            <pc:docMk/>
+            <pc:sldMk cId="3765396124" sldId="429"/>
+            <ac:picMk id="6" creationId="{B12FFA45-4A5D-5628-8CFB-5E1FCEC7BEBA}"/>
+          </ac:picMkLst>
+        </pc:picChg>
+        <pc:picChg chg="add del mod">
+          <ac:chgData name="Jonathan Mah" userId="5261b2f2f3e51194" providerId="LiveId" clId="{833092D5-9927-4807-BE3E-672C10A7E002}" dt="2023-07-14T22:41:34.329" v="2014" actId="478"/>
+          <ac:picMkLst>
+            <pc:docMk/>
+            <pc:sldMk cId="3765396124" sldId="429"/>
+            <ac:picMk id="7" creationId="{BACBF593-5D52-D2B5-F061-AAB15046DF12}"/>
+          </ac:picMkLst>
+        </pc:picChg>
+        <pc:picChg chg="mod">
+          <ac:chgData name="Jonathan Mah" userId="5261b2f2f3e51194" providerId="LiveId" clId="{833092D5-9927-4807-BE3E-672C10A7E002}" dt="2023-07-19T19:51:51.366" v="2277" actId="14100"/>
+          <ac:picMkLst>
+            <pc:docMk/>
+            <pc:sldMk cId="3765396124" sldId="429"/>
+            <ac:picMk id="8" creationId="{6BDC0236-82EF-9A85-03C0-549F8E58DEEF}"/>
+          </ac:picMkLst>
+        </pc:picChg>
+        <pc:picChg chg="del">
+          <ac:chgData name="Jonathan Mah" userId="5261b2f2f3e51194" providerId="LiveId" clId="{833092D5-9927-4807-BE3E-672C10A7E002}" dt="2023-07-14T22:34:06.266" v="1983" actId="478"/>
+          <ac:picMkLst>
+            <pc:docMk/>
+            <pc:sldMk cId="3765396124" sldId="429"/>
+            <ac:picMk id="9" creationId="{381FC2B0-7964-FD80-2C11-756D2D9CC609}"/>
+          </ac:picMkLst>
+        </pc:picChg>
+        <pc:picChg chg="del">
+          <ac:chgData name="Jonathan Mah" userId="5261b2f2f3e51194" providerId="LiveId" clId="{833092D5-9927-4807-BE3E-672C10A7E002}" dt="2023-07-14T22:34:09.853" v="1986" actId="478"/>
+          <ac:picMkLst>
+            <pc:docMk/>
+            <pc:sldMk cId="3765396124" sldId="429"/>
+            <ac:picMk id="10" creationId="{5F877A63-EC70-D916-8C2B-74C6B014F364}"/>
+          </ac:picMkLst>
+        </pc:picChg>
+        <pc:picChg chg="del">
+          <ac:chgData name="Jonathan Mah" userId="5261b2f2f3e51194" providerId="LiveId" clId="{833092D5-9927-4807-BE3E-672C10A7E002}" dt="2023-07-14T22:34:11.590" v="1988" actId="478"/>
+          <ac:picMkLst>
+            <pc:docMk/>
+            <pc:sldMk cId="3765396124" sldId="429"/>
+            <ac:picMk id="11" creationId="{1F5A82E0-FF26-1C74-0576-7A582FC88F42}"/>
+          </ac:picMkLst>
+        </pc:picChg>
+        <pc:picChg chg="add del mod">
+          <ac:chgData name="Jonathan Mah" userId="5261b2f2f3e51194" providerId="LiveId" clId="{833092D5-9927-4807-BE3E-672C10A7E002}" dt="2023-07-14T22:41:32.688" v="2013" actId="478"/>
+          <ac:picMkLst>
+            <pc:docMk/>
+            <pc:sldMk cId="3765396124" sldId="429"/>
+            <ac:picMk id="15" creationId="{A97B6972-B632-7251-0DEB-B0E99F116C2A}"/>
+          </ac:picMkLst>
+        </pc:picChg>
+        <pc:picChg chg="add mod">
+          <ac:chgData name="Jonathan Mah" userId="5261b2f2f3e51194" providerId="LiveId" clId="{833092D5-9927-4807-BE3E-672C10A7E002}" dt="2023-07-19T19:51:35.932" v="2276" actId="14100"/>
+          <ac:picMkLst>
+            <pc:docMk/>
+            <pc:sldMk cId="3765396124" sldId="429"/>
+            <ac:picMk id="16" creationId="{62363C92-E439-E0A0-D3EE-25ED54B7C702}"/>
           </ac:picMkLst>
         </pc:picChg>
       </pc:sldChg>
@@ -4750,7 +4933,7 @@
           <a:p>
             <a:fld id="{224F4B04-6A50-4A51-B675-D86EC6563060}" type="datetimeFigureOut">
               <a:rPr lang="en-US" smtClean="0"/>
-              <a:t>7/5/2023</a:t>
+              <a:t>7/19/2023</a:t>
             </a:fld>
             <a:endParaRPr lang="en-US"/>
           </a:p>
@@ -5372,7 +5555,7 @@
           <a:p>
             <a:fld id="{54E435BD-4569-4C00-96FD-DE6EEAA430DA}" type="datetimeFigureOut">
               <a:rPr lang="en-US" smtClean="0"/>
-              <a:t>7/5/2023</a:t>
+              <a:t>7/19/2023</a:t>
             </a:fld>
             <a:endParaRPr lang="en-US"/>
           </a:p>
@@ -5542,7 +5725,7 @@
           <a:p>
             <a:fld id="{54E435BD-4569-4C00-96FD-DE6EEAA430DA}" type="datetimeFigureOut">
               <a:rPr lang="en-US" smtClean="0"/>
-              <a:t>7/5/2023</a:t>
+              <a:t>7/19/2023</a:t>
             </a:fld>
             <a:endParaRPr lang="en-US"/>
           </a:p>
@@ -5722,7 +5905,7 @@
           <a:p>
             <a:fld id="{54E435BD-4569-4C00-96FD-DE6EEAA430DA}" type="datetimeFigureOut">
               <a:rPr lang="en-US" smtClean="0"/>
-              <a:t>7/5/2023</a:t>
+              <a:t>7/19/2023</a:t>
             </a:fld>
             <a:endParaRPr lang="en-US"/>
           </a:p>
@@ -5892,7 +6075,7 @@
           <a:p>
             <a:fld id="{54E435BD-4569-4C00-96FD-DE6EEAA430DA}" type="datetimeFigureOut">
               <a:rPr lang="en-US" smtClean="0"/>
-              <a:t>7/5/2023</a:t>
+              <a:t>7/19/2023</a:t>
             </a:fld>
             <a:endParaRPr lang="en-US"/>
           </a:p>
@@ -6136,7 +6319,7 @@
           <a:p>
             <a:fld id="{54E435BD-4569-4C00-96FD-DE6EEAA430DA}" type="datetimeFigureOut">
               <a:rPr lang="en-US" smtClean="0"/>
-              <a:t>7/5/2023</a:t>
+              <a:t>7/19/2023</a:t>
             </a:fld>
             <a:endParaRPr lang="en-US"/>
           </a:p>
@@ -6368,7 +6551,7 @@
           <a:p>
             <a:fld id="{54E435BD-4569-4C00-96FD-DE6EEAA430DA}" type="datetimeFigureOut">
               <a:rPr lang="en-US" smtClean="0"/>
-              <a:t>7/5/2023</a:t>
+              <a:t>7/19/2023</a:t>
             </a:fld>
             <a:endParaRPr lang="en-US"/>
           </a:p>
@@ -6735,7 +6918,7 @@
           <a:p>
             <a:fld id="{54E435BD-4569-4C00-96FD-DE6EEAA430DA}" type="datetimeFigureOut">
               <a:rPr lang="en-US" smtClean="0"/>
-              <a:t>7/5/2023</a:t>
+              <a:t>7/19/2023</a:t>
             </a:fld>
             <a:endParaRPr lang="en-US"/>
           </a:p>
@@ -6853,7 +7036,7 @@
           <a:p>
             <a:fld id="{54E435BD-4569-4C00-96FD-DE6EEAA430DA}" type="datetimeFigureOut">
               <a:rPr lang="en-US" smtClean="0"/>
-              <a:t>7/5/2023</a:t>
+              <a:t>7/19/2023</a:t>
             </a:fld>
             <a:endParaRPr lang="en-US"/>
           </a:p>
@@ -6948,7 +7131,7 @@
           <a:p>
             <a:fld id="{54E435BD-4569-4C00-96FD-DE6EEAA430DA}" type="datetimeFigureOut">
               <a:rPr lang="en-US" smtClean="0"/>
-              <a:t>7/5/2023</a:t>
+              <a:t>7/19/2023</a:t>
             </a:fld>
             <a:endParaRPr lang="en-US"/>
           </a:p>
@@ -7225,7 +7408,7 @@
           <a:p>
             <a:fld id="{54E435BD-4569-4C00-96FD-DE6EEAA430DA}" type="datetimeFigureOut">
               <a:rPr lang="en-US" smtClean="0"/>
-              <a:t>7/5/2023</a:t>
+              <a:t>7/19/2023</a:t>
             </a:fld>
             <a:endParaRPr lang="en-US"/>
           </a:p>
@@ -7482,7 +7665,7 @@
           <a:p>
             <a:fld id="{54E435BD-4569-4C00-96FD-DE6EEAA430DA}" type="datetimeFigureOut">
               <a:rPr lang="en-US" smtClean="0"/>
-              <a:t>7/5/2023</a:t>
+              <a:t>7/19/2023</a:t>
             </a:fld>
             <a:endParaRPr lang="en-US"/>
           </a:p>
@@ -7695,7 +7878,7 @@
           <a:p>
             <a:fld id="{54E435BD-4569-4C00-96FD-DE6EEAA430DA}" type="datetimeFigureOut">
               <a:rPr lang="en-US" smtClean="0"/>
-              <a:t>7/5/2023</a:t>
+              <a:t>7/19/2023</a:t>
             </a:fld>
             <a:endParaRPr lang="en-US"/>
           </a:p>
@@ -8721,6 +8904,218 @@
     <p:extLst>
       <p:ext uri="{BB962C8B-B14F-4D97-AF65-F5344CB8AC3E}">
         <p14:creationId xmlns:p14="http://schemas.microsoft.com/office/powerpoint/2010/main" val="652272095"/>
+      </p:ext>
+    </p:extLst>
+  </p:cSld>
+  <p:clrMapOvr>
+    <a:masterClrMapping/>
+  </p:clrMapOvr>
+</p:sld>
+</file>
+
+<file path=ppt/slides/slide12.xml><?xml version="1.0" encoding="utf-8"?>
+<p:sld xmlns:a="http://schemas.openxmlformats.org/drawingml/2006/main" xmlns:r="http://schemas.openxmlformats.org/officeDocument/2006/relationships" xmlns:p="http://schemas.openxmlformats.org/presentationml/2006/main">
+  <p:cSld>
+    <p:spTree>
+      <p:nvGrpSpPr>
+        <p:cNvPr id="1" name=""/>
+        <p:cNvGrpSpPr/>
+        <p:nvPr/>
+      </p:nvGrpSpPr>
+      <p:grpSpPr>
+        <a:xfrm>
+          <a:off x="0" y="0"/>
+          <a:ext cx="0" cy="0"/>
+          <a:chOff x="0" y="0"/>
+          <a:chExt cx="0" cy="0"/>
+        </a:xfrm>
+      </p:grpSpPr>
+      <p:pic>
+        <p:nvPicPr>
+          <p:cNvPr id="8" name="Picture 7" descr="A picture containing black, darkness&#10;&#10;Description automatically generated">
+            <a:extLst>
+              <a:ext uri="{FF2B5EF4-FFF2-40B4-BE49-F238E27FC236}">
+                <a16:creationId xmlns:a16="http://schemas.microsoft.com/office/drawing/2014/main" id="{6BDC0236-82EF-9A85-03C0-549F8E58DEEF}"/>
+              </a:ext>
+            </a:extLst>
+          </p:cNvPr>
+          <p:cNvPicPr>
+            <a:picLocks noChangeAspect="1"/>
+          </p:cNvPicPr>
+          <p:nvPr/>
+        </p:nvPicPr>
+        <p:blipFill rotWithShape="1">
+          <a:blip r:embed="rId2">
+            <a:extLst>
+              <a:ext uri="{28A0092B-C50C-407E-A947-70E740481C1C}">
+                <a14:useLocalDpi xmlns:a14="http://schemas.microsoft.com/office/drawing/2010/main" val="0"/>
+              </a:ext>
+            </a:extLst>
+          </a:blip>
+          <a:srcRect r="36866" b="6162"/>
+          <a:stretch/>
+        </p:blipFill>
+        <p:spPr>
+          <a:xfrm>
+            <a:off x="187546" y="5912434"/>
+            <a:ext cx="2505075" cy="6876882"/>
+          </a:xfrm>
+          <a:prstGeom prst="rect">
+            <a:avLst/>
+          </a:prstGeom>
+        </p:spPr>
+      </p:pic>
+      <p:pic>
+        <p:nvPicPr>
+          <p:cNvPr id="3" name="Picture 2" descr="A picture containing text, screenshot, colorfulness, font&#10;&#10;Description automatically generated">
+            <a:extLst>
+              <a:ext uri="{FF2B5EF4-FFF2-40B4-BE49-F238E27FC236}">
+                <a16:creationId xmlns:a16="http://schemas.microsoft.com/office/drawing/2014/main" id="{1C88653A-C506-B445-4F6E-1CD84D2FD5F3}"/>
+              </a:ext>
+            </a:extLst>
+          </p:cNvPr>
+          <p:cNvPicPr>
+            <a:picLocks noChangeAspect="1"/>
+          </p:cNvPicPr>
+          <p:nvPr/>
+        </p:nvPicPr>
+        <p:blipFill rotWithShape="1">
+          <a:blip r:embed="rId3">
+            <a:extLst>
+              <a:ext uri="{28A0092B-C50C-407E-A947-70E740481C1C}">
+                <a14:useLocalDpi xmlns:a14="http://schemas.microsoft.com/office/drawing/2010/main" val="0"/>
+              </a:ext>
+            </a:extLst>
+          </a:blip>
+          <a:srcRect l="6339" r="55654"/>
+          <a:stretch/>
+        </p:blipFill>
+        <p:spPr>
+          <a:xfrm>
+            <a:off x="2692621" y="5784902"/>
+            <a:ext cx="2172389" cy="7742412"/>
+          </a:xfrm>
+          <a:prstGeom prst="rect">
+            <a:avLst/>
+          </a:prstGeom>
+        </p:spPr>
+      </p:pic>
+      <p:pic>
+        <p:nvPicPr>
+          <p:cNvPr id="16" name="Picture 15" descr="A picture containing black, darkness&#10;&#10;Description automatically generated">
+            <a:extLst>
+              <a:ext uri="{FF2B5EF4-FFF2-40B4-BE49-F238E27FC236}">
+                <a16:creationId xmlns:a16="http://schemas.microsoft.com/office/drawing/2014/main" id="{62363C92-E439-E0A0-D3EE-25ED54B7C702}"/>
+              </a:ext>
+            </a:extLst>
+          </p:cNvPr>
+          <p:cNvPicPr>
+            <a:picLocks/>
+          </p:cNvPicPr>
+          <p:nvPr/>
+        </p:nvPicPr>
+        <p:blipFill rotWithShape="1">
+          <a:blip r:embed="rId2">
+            <a:extLst>
+              <a:ext uri="{28A0092B-C50C-407E-A947-70E740481C1C}">
+                <a14:useLocalDpi xmlns:a14="http://schemas.microsoft.com/office/drawing/2010/main" val="0"/>
+              </a:ext>
+            </a:extLst>
+          </a:blip>
+          <a:srcRect r="36866" b="6162"/>
+          <a:stretch/>
+        </p:blipFill>
+        <p:spPr>
+          <a:xfrm rot="5400000" flipV="1">
+            <a:off x="9659599" y="-1786825"/>
+            <a:ext cx="2850126" cy="12263322"/>
+          </a:xfrm>
+          <a:prstGeom prst="rect">
+            <a:avLst/>
+          </a:prstGeom>
+        </p:spPr>
+      </p:pic>
+      <p:sp>
+        <p:nvSpPr>
+          <p:cNvPr id="17" name="TextBox 16">
+            <a:extLst>
+              <a:ext uri="{FF2B5EF4-FFF2-40B4-BE49-F238E27FC236}">
+                <a16:creationId xmlns:a16="http://schemas.microsoft.com/office/drawing/2014/main" id="{CA956D0F-F840-901A-8FCC-83072C36A26C}"/>
+              </a:ext>
+            </a:extLst>
+          </p:cNvPr>
+          <p:cNvSpPr txBox="1"/>
+          <p:nvPr/>
+        </p:nvSpPr>
+        <p:spPr>
+          <a:xfrm>
+            <a:off x="17216321" y="5369789"/>
+            <a:ext cx="1187793" cy="400110"/>
+          </a:xfrm>
+          <a:prstGeom prst="rect">
+            <a:avLst/>
+          </a:prstGeom>
+          <a:noFill/>
+        </p:spPr>
+        <p:txBody>
+          <a:bodyPr wrap="square" rtlCol="0">
+            <a:spAutoFit/>
+          </a:bodyPr>
+          <a:lstStyle/>
+          <a:p>
+            <a:r>
+              <a:rPr lang="en-US" sz="1000" b="1" dirty="0">
+                <a:latin typeface="Arial" panose="020B0604020202020204" pitchFamily="34" charset="0"/>
+                <a:cs typeface="Arial" panose="020B0604020202020204" pitchFamily="34" charset="0"/>
+              </a:rPr>
+              <a:t>Log Likelihood</a:t>
+            </a:r>
+          </a:p>
+          <a:p>
+            <a:r>
+              <a:rPr lang="en-US" sz="1000" b="1" dirty="0">
+                <a:latin typeface="Arial" panose="020B0604020202020204" pitchFamily="34" charset="0"/>
+                <a:cs typeface="Arial" panose="020B0604020202020204" pitchFamily="34" charset="0"/>
+              </a:rPr>
+              <a:t>Ratio Test</a:t>
+            </a:r>
+          </a:p>
+        </p:txBody>
+      </p:sp>
+      <p:pic>
+        <p:nvPicPr>
+          <p:cNvPr id="5" name="Picture 4">
+            <a:extLst>
+              <a:ext uri="{FF2B5EF4-FFF2-40B4-BE49-F238E27FC236}">
+                <a16:creationId xmlns:a16="http://schemas.microsoft.com/office/drawing/2014/main" id="{DF3CF68F-65E3-018A-CE7F-3D7703037ABA}"/>
+              </a:ext>
+            </a:extLst>
+          </p:cNvPr>
+          <p:cNvPicPr>
+            <a:picLocks noChangeAspect="1"/>
+          </p:cNvPicPr>
+          <p:nvPr/>
+        </p:nvPicPr>
+        <p:blipFill>
+          <a:blip r:embed="rId4"/>
+          <a:stretch>
+            <a:fillRect/>
+          </a:stretch>
+        </p:blipFill>
+        <p:spPr>
+          <a:xfrm>
+            <a:off x="4865010" y="5784902"/>
+            <a:ext cx="13011150" cy="7096125"/>
+          </a:xfrm>
+          <a:prstGeom prst="rect">
+            <a:avLst/>
+          </a:prstGeom>
+        </p:spPr>
+      </p:pic>
+    </p:spTree>
+    <p:extLst>
+      <p:ext uri="{BB962C8B-B14F-4D97-AF65-F5344CB8AC3E}">
+        <p14:creationId xmlns:p14="http://schemas.microsoft.com/office/powerpoint/2010/main" val="3765396124"/>
       </p:ext>
     </p:extLst>
   </p:cSld>

</xml_diff>

<commit_message>
Re-ordered supplement, added separate folder
</commit_message>
<xml_diff>
--- a/Summary/figures.pptx
+++ b/Summary/figures.pptx
@@ -5,7 +5,7 @@
     <p:sldMasterId id="2147483672" r:id="rId1"/>
   </p:sldMasterIdLst>
   <p:notesMasterIdLst>
-    <p:notesMasterId r:id="rId27"/>
+    <p:notesMasterId r:id="rId33"/>
   </p:notesMasterIdLst>
   <p:sldIdLst>
     <p:sldId id="420" r:id="rId2"/>
@@ -33,6 +33,12 @@
     <p:sldId id="451" r:id="rId24"/>
     <p:sldId id="452" r:id="rId25"/>
     <p:sldId id="453" r:id="rId26"/>
+    <p:sldId id="456" r:id="rId27"/>
+    <p:sldId id="457" r:id="rId28"/>
+    <p:sldId id="458" r:id="rId29"/>
+    <p:sldId id="459" r:id="rId30"/>
+    <p:sldId id="460" r:id="rId31"/>
+    <p:sldId id="461" r:id="rId32"/>
   </p:sldIdLst>
   <p:sldSz cx="22860000" cy="22860000"/>
   <p:notesSz cx="6858000" cy="9144000"/>
@@ -142,7 +148,7 @@
 <file path=ppt/revisionInfo.xml><?xml version="1.0" encoding="utf-8"?>
 <p1510:revInfo xmlns:a="http://schemas.openxmlformats.org/drawingml/2006/main" xmlns:r="http://schemas.openxmlformats.org/officeDocument/2006/relationships" xmlns:p1510="http://schemas.microsoft.com/office/powerpoint/2015/10/main">
   <p1510:revLst>
-    <p1510:client id="{833092D5-9927-4807-BE3E-672C10A7E002}" v="308" dt="2023-09-25T17:55:41.782"/>
+    <p1510:client id="{833092D5-9927-4807-BE3E-672C10A7E002}" v="324" dt="2023-10-05T22:03:29.318"/>
   </p1510:revLst>
 </p1510:revInfo>
 </file>
@@ -192,7 +198,7 @@
   <pc:docChgLst>
     <pc:chgData name="Jonathan Mah" userId="5261b2f2f3e51194" providerId="LiveId" clId="{833092D5-9927-4807-BE3E-672C10A7E002}"/>
     <pc:docChg chg="undo redo custSel addSld delSld modSld sldOrd">
-      <pc:chgData name="Jonathan Mah" userId="5261b2f2f3e51194" providerId="LiveId" clId="{833092D5-9927-4807-BE3E-672C10A7E002}" dt="2023-09-25T17:55:43.775" v="3702" actId="1076"/>
+      <pc:chgData name="Jonathan Mah" userId="5261b2f2f3e51194" providerId="LiveId" clId="{833092D5-9927-4807-BE3E-672C10A7E002}" dt="2023-10-06T00:13:54.081" v="3749" actId="1076"/>
       <pc:docMkLst>
         <pc:docMk/>
       </pc:docMkLst>
@@ -4441,7 +4447,7 @@
         </pc:picChg>
       </pc:sldChg>
       <pc:sldChg chg="addSp delSp modSp new mod">
-        <pc:chgData name="Jonathan Mah" userId="5261b2f2f3e51194" providerId="LiveId" clId="{833092D5-9927-4807-BE3E-672C10A7E002}" dt="2023-09-06T23:43:51.321" v="3556" actId="1035"/>
+        <pc:chgData name="Jonathan Mah" userId="5261b2f2f3e51194" providerId="LiveId" clId="{833092D5-9927-4807-BE3E-672C10A7E002}" dt="2023-10-06T00:13:54.081" v="3749" actId="1076"/>
         <pc:sldMkLst>
           <pc:docMk/>
           <pc:sldMk cId="3690159507" sldId="425"/>
@@ -4502,6 +4508,14 @@
             <ac:spMk id="10" creationId="{4D7692BF-9251-A594-95CD-EA81867F6D67}"/>
           </ac:spMkLst>
         </pc:spChg>
+        <pc:picChg chg="add del mod">
+          <ac:chgData name="Jonathan Mah" userId="5261b2f2f3e51194" providerId="LiveId" clId="{833092D5-9927-4807-BE3E-672C10A7E002}" dt="2023-10-05T21:59:35.853" v="3723" actId="478"/>
+          <ac:picMkLst>
+            <pc:docMk/>
+            <pc:sldMk cId="3690159507" sldId="425"/>
+            <ac:picMk id="3" creationId="{89040A80-B777-77DD-00BD-319006296979}"/>
+          </ac:picMkLst>
+        </pc:picChg>
         <pc:picChg chg="add del mod ord">
           <ac:chgData name="Jonathan Mah" userId="5261b2f2f3e51194" providerId="LiveId" clId="{833092D5-9927-4807-BE3E-672C10A7E002}" dt="2023-07-05T18:25:58.131" v="1967" actId="478"/>
           <ac:picMkLst>
@@ -4542,6 +4556,14 @@
             <ac:picMk id="5" creationId="{2B7591D3-B0A6-2321-FF9B-0FE0E1307AD0}"/>
           </ac:picMkLst>
         </pc:picChg>
+        <pc:picChg chg="add del mod ord">
+          <ac:chgData name="Jonathan Mah" userId="5261b2f2f3e51194" providerId="LiveId" clId="{833092D5-9927-4807-BE3E-672C10A7E002}" dt="2023-10-05T22:01:13.187" v="3727" actId="478"/>
+          <ac:picMkLst>
+            <pc:docMk/>
+            <pc:sldMk cId="3690159507" sldId="425"/>
+            <ac:picMk id="5" creationId="{792EFAF8-84EA-E253-D76E-55897E18CAC0}"/>
+          </ac:picMkLst>
+        </pc:picChg>
         <pc:picChg chg="add del">
           <ac:chgData name="Jonathan Mah" userId="5261b2f2f3e51194" providerId="LiveId" clId="{833092D5-9927-4807-BE3E-672C10A7E002}" dt="2023-06-28T21:03:36.242" v="1745" actId="478"/>
           <ac:picMkLst>
@@ -4550,8 +4572,8 @@
             <ac:picMk id="5" creationId="{F078F9C3-92EB-F9F2-A4E4-977B20ABD6A6}"/>
           </ac:picMkLst>
         </pc:picChg>
-        <pc:picChg chg="add mod ord">
-          <ac:chgData name="Jonathan Mah" userId="5261b2f2f3e51194" providerId="LiveId" clId="{833092D5-9927-4807-BE3E-672C10A7E002}" dt="2023-09-06T23:43:51.321" v="3556" actId="1035"/>
+        <pc:picChg chg="add del mod ord">
+          <ac:chgData name="Jonathan Mah" userId="5261b2f2f3e51194" providerId="LiveId" clId="{833092D5-9927-4807-BE3E-672C10A7E002}" dt="2023-10-05T22:00:39.923" v="3724" actId="478"/>
           <ac:picMkLst>
             <pc:docMk/>
             <pc:sldMk cId="3690159507" sldId="425"/>
@@ -4574,12 +4596,28 @@
             <ac:picMk id="12" creationId="{93158C25-725B-B62F-68DD-FC42C68AC8D8}"/>
           </ac:picMkLst>
         </pc:picChg>
+        <pc:picChg chg="add del mod ord">
+          <ac:chgData name="Jonathan Mah" userId="5261b2f2f3e51194" providerId="LiveId" clId="{833092D5-9927-4807-BE3E-672C10A7E002}" dt="2023-10-05T22:03:21.042" v="3733" actId="478"/>
+          <ac:picMkLst>
+            <pc:docMk/>
+            <pc:sldMk cId="3690159507" sldId="425"/>
+            <ac:picMk id="13" creationId="{5373F150-8966-558F-9A20-34C9A79A3DE5}"/>
+          </ac:picMkLst>
+        </pc:picChg>
         <pc:picChg chg="add del mod">
           <ac:chgData name="Jonathan Mah" userId="5261b2f2f3e51194" providerId="LiveId" clId="{833092D5-9927-4807-BE3E-672C10A7E002}" dt="2023-06-28T23:51:12.349" v="1794" actId="478"/>
           <ac:picMkLst>
             <pc:docMk/>
             <pc:sldMk cId="3690159507" sldId="425"/>
             <ac:picMk id="14" creationId="{55C4AF18-9652-A6CE-3730-FB94C8A694A5}"/>
+          </ac:picMkLst>
+        </pc:picChg>
+        <pc:picChg chg="add mod ord">
+          <ac:chgData name="Jonathan Mah" userId="5261b2f2f3e51194" providerId="LiveId" clId="{833092D5-9927-4807-BE3E-672C10A7E002}" dt="2023-10-06T00:13:54.081" v="3749" actId="1076"/>
+          <ac:picMkLst>
+            <pc:docMk/>
+            <pc:sldMk cId="3690159507" sldId="425"/>
+            <ac:picMk id="15" creationId="{15B7A2D7-94AC-3739-DF87-A6B2AB78F166}"/>
           </ac:picMkLst>
         </pc:picChg>
         <pc:picChg chg="add del mod ord">
@@ -5595,7 +5633,7 @@
         </pc:picChg>
       </pc:sldChg>
       <pc:sldChg chg="addSp delSp modSp new mod">
-        <pc:chgData name="Jonathan Mah" userId="5261b2f2f3e51194" providerId="LiveId" clId="{833092D5-9927-4807-BE3E-672C10A7E002}" dt="2023-08-02T18:41:28.497" v="2833" actId="20577"/>
+        <pc:chgData name="Jonathan Mah" userId="5261b2f2f3e51194" providerId="LiveId" clId="{833092D5-9927-4807-BE3E-672C10A7E002}" dt="2023-10-05T21:58:43.087" v="3720" actId="478"/>
         <pc:sldMkLst>
           <pc:docMk/>
           <pc:sldMk cId="1025585485" sldId="438"/>
@@ -5680,6 +5718,14 @@
             <ac:spMk id="34" creationId="{C0CAA44D-4916-7B0E-0415-A928E1C3E6EE}"/>
           </ac:spMkLst>
         </pc:spChg>
+        <pc:picChg chg="add del mod">
+          <ac:chgData name="Jonathan Mah" userId="5261b2f2f3e51194" providerId="LiveId" clId="{833092D5-9927-4807-BE3E-672C10A7E002}" dt="2023-10-05T21:58:42.636" v="3719" actId="931"/>
+          <ac:picMkLst>
+            <pc:docMk/>
+            <pc:sldMk cId="1025585485" sldId="438"/>
+            <ac:picMk id="3" creationId="{884C19C1-458E-428C-3B0D-B86ECE5099BA}"/>
+          </ac:picMkLst>
+        </pc:picChg>
         <pc:picChg chg="add del mod">
           <ac:chgData name="Jonathan Mah" userId="5261b2f2f3e51194" providerId="LiveId" clId="{833092D5-9927-4807-BE3E-672C10A7E002}" dt="2023-08-02T18:21:15.108" v="2678" actId="478"/>
           <ac:picMkLst>
@@ -5792,8 +5838,8 @@
             <ac:picMk id="24" creationId="{43AB49EB-214D-8AAA-CE4F-67E3A6EF0C7A}"/>
           </ac:picMkLst>
         </pc:picChg>
-        <pc:picChg chg="add mod ord">
-          <ac:chgData name="Jonathan Mah" userId="5261b2f2f3e51194" providerId="LiveId" clId="{833092D5-9927-4807-BE3E-672C10A7E002}" dt="2023-08-02T18:38:36.491" v="2733" actId="167"/>
+        <pc:picChg chg="add del mod ord">
+          <ac:chgData name="Jonathan Mah" userId="5261b2f2f3e51194" providerId="LiveId" clId="{833092D5-9927-4807-BE3E-672C10A7E002}" dt="2023-10-05T21:58:43.087" v="3720" actId="478"/>
           <ac:picMkLst>
             <pc:docMk/>
             <pc:sldMk cId="1025585485" sldId="438"/>
@@ -6866,8 +6912,8 @@
           </ac:picMkLst>
         </pc:picChg>
       </pc:sldChg>
-      <pc:sldChg chg="delSp new mod">
-        <pc:chgData name="Jonathan Mah" userId="5261b2f2f3e51194" providerId="LiveId" clId="{833092D5-9927-4807-BE3E-672C10A7E002}" dt="2023-09-18T20:13:07.248" v="3630" actId="478"/>
+      <pc:sldChg chg="addSp delSp modSp new mod">
+        <pc:chgData name="Jonathan Mah" userId="5261b2f2f3e51194" providerId="LiveId" clId="{833092D5-9927-4807-BE3E-672C10A7E002}" dt="2023-10-03T17:22:33.133" v="3714" actId="931"/>
         <pc:sldMkLst>
           <pc:docMk/>
           <pc:sldMk cId="3734765804" sldId="453"/>
@@ -6888,6 +6934,30 @@
             <ac:spMk id="3" creationId="{5A9FC7E2-16E1-8CE9-8F1B-C1AC67E68075}"/>
           </ac:spMkLst>
         </pc:spChg>
+        <pc:picChg chg="add del mod">
+          <ac:chgData name="Jonathan Mah" userId="5261b2f2f3e51194" providerId="LiveId" clId="{833092D5-9927-4807-BE3E-672C10A7E002}" dt="2023-10-03T17:21:25.633" v="3711" actId="478"/>
+          <ac:picMkLst>
+            <pc:docMk/>
+            <pc:sldMk cId="3734765804" sldId="453"/>
+            <ac:picMk id="3" creationId="{226F07FB-40D9-515E-8E4C-0CE984719BE5}"/>
+          </ac:picMkLst>
+        </pc:picChg>
+        <pc:picChg chg="add del mod">
+          <ac:chgData name="Jonathan Mah" userId="5261b2f2f3e51194" providerId="LiveId" clId="{833092D5-9927-4807-BE3E-672C10A7E002}" dt="2023-10-03T17:22:28.580" v="3713" actId="478"/>
+          <ac:picMkLst>
+            <pc:docMk/>
+            <pc:sldMk cId="3734765804" sldId="453"/>
+            <ac:picMk id="5" creationId="{7B6D1D5D-3FBA-4845-64E3-DFE627D293D0}"/>
+          </ac:picMkLst>
+        </pc:picChg>
+        <pc:picChg chg="add mod">
+          <ac:chgData name="Jonathan Mah" userId="5261b2f2f3e51194" providerId="LiveId" clId="{833092D5-9927-4807-BE3E-672C10A7E002}" dt="2023-10-03T17:22:33.133" v="3714" actId="931"/>
+          <ac:picMkLst>
+            <pc:docMk/>
+            <pc:sldMk cId="3734765804" sldId="453"/>
+            <ac:picMk id="7" creationId="{DC2A0D2E-27A3-F6E9-CED9-5056936258A6}"/>
+          </ac:picMkLst>
+        </pc:picChg>
       </pc:sldChg>
       <pc:sldChg chg="addSp delSp modSp new mod">
         <pc:chgData name="Jonathan Mah" userId="5261b2f2f3e51194" providerId="LiveId" clId="{833092D5-9927-4807-BE3E-672C10A7E002}" dt="2023-09-22T17:31:35.652" v="3677" actId="1076"/>
@@ -7014,6 +7084,56 @@
             <ac:picMk id="21" creationId="{98237FB5-660D-F8CD-39CD-48042FC68999}"/>
           </ac:picMkLst>
         </pc:picChg>
+      </pc:sldChg>
+      <pc:sldChg chg="addSp modSp add mod">
+        <pc:chgData name="Jonathan Mah" userId="5261b2f2f3e51194" providerId="LiveId" clId="{833092D5-9927-4807-BE3E-672C10A7E002}" dt="2023-10-03T21:23:39.046" v="3716" actId="1076"/>
+        <pc:sldMkLst>
+          <pc:docMk/>
+          <pc:sldMk cId="2098746185" sldId="456"/>
+        </pc:sldMkLst>
+        <pc:picChg chg="add mod">
+          <ac:chgData name="Jonathan Mah" userId="5261b2f2f3e51194" providerId="LiveId" clId="{833092D5-9927-4807-BE3E-672C10A7E002}" dt="2023-10-03T21:23:39.046" v="3716" actId="1076"/>
+          <ac:picMkLst>
+            <pc:docMk/>
+            <pc:sldMk cId="2098746185" sldId="456"/>
+            <ac:picMk id="3" creationId="{59A03E0A-9FE4-004A-F62B-1A2BE7F6B001}"/>
+          </ac:picMkLst>
+        </pc:picChg>
+      </pc:sldChg>
+      <pc:sldChg chg="add">
+        <pc:chgData name="Jonathan Mah" userId="5261b2f2f3e51194" providerId="LiveId" clId="{833092D5-9927-4807-BE3E-672C10A7E002}" dt="2023-10-03T17:18:47.806" v="3704"/>
+        <pc:sldMkLst>
+          <pc:docMk/>
+          <pc:sldMk cId="3606136103" sldId="457"/>
+        </pc:sldMkLst>
+      </pc:sldChg>
+      <pc:sldChg chg="add">
+        <pc:chgData name="Jonathan Mah" userId="5261b2f2f3e51194" providerId="LiveId" clId="{833092D5-9927-4807-BE3E-672C10A7E002}" dt="2023-10-03T17:18:47.973" v="3705"/>
+        <pc:sldMkLst>
+          <pc:docMk/>
+          <pc:sldMk cId="2839755505" sldId="458"/>
+        </pc:sldMkLst>
+      </pc:sldChg>
+      <pc:sldChg chg="add">
+        <pc:chgData name="Jonathan Mah" userId="5261b2f2f3e51194" providerId="LiveId" clId="{833092D5-9927-4807-BE3E-672C10A7E002}" dt="2023-10-03T17:18:48.113" v="3706"/>
+        <pc:sldMkLst>
+          <pc:docMk/>
+          <pc:sldMk cId="3270000141" sldId="459"/>
+        </pc:sldMkLst>
+      </pc:sldChg>
+      <pc:sldChg chg="add">
+        <pc:chgData name="Jonathan Mah" userId="5261b2f2f3e51194" providerId="LiveId" clId="{833092D5-9927-4807-BE3E-672C10A7E002}" dt="2023-10-03T17:18:48.252" v="3707"/>
+        <pc:sldMkLst>
+          <pc:docMk/>
+          <pc:sldMk cId="1334374382" sldId="460"/>
+        </pc:sldMkLst>
+      </pc:sldChg>
+      <pc:sldChg chg="add">
+        <pc:chgData name="Jonathan Mah" userId="5261b2f2f3e51194" providerId="LiveId" clId="{833092D5-9927-4807-BE3E-672C10A7E002}" dt="2023-10-03T17:18:48.397" v="3708"/>
+        <pc:sldMkLst>
+          <pc:docMk/>
+          <pc:sldMk cId="603531214" sldId="461"/>
+        </pc:sldMkLst>
       </pc:sldChg>
     </pc:docChg>
   </pc:docChgLst>
@@ -7102,7 +7222,7 @@
           <a:p>
             <a:fld id="{224F4B04-6A50-4A51-B675-D86EC6563060}" type="datetimeFigureOut">
               <a:rPr lang="en-US" smtClean="0"/>
-              <a:t>9/25/2023</a:t>
+              <a:t>10/5/2023</a:t>
             </a:fld>
             <a:endParaRPr lang="en-US"/>
           </a:p>
@@ -8162,7 +8282,7 @@
           <a:p>
             <a:fld id="{54E435BD-4569-4C00-96FD-DE6EEAA430DA}" type="datetimeFigureOut">
               <a:rPr lang="en-US" smtClean="0"/>
-              <a:t>9/25/2023</a:t>
+              <a:t>10/5/2023</a:t>
             </a:fld>
             <a:endParaRPr lang="en-US"/>
           </a:p>
@@ -8332,7 +8452,7 @@
           <a:p>
             <a:fld id="{54E435BD-4569-4C00-96FD-DE6EEAA430DA}" type="datetimeFigureOut">
               <a:rPr lang="en-US" smtClean="0"/>
-              <a:t>9/25/2023</a:t>
+              <a:t>10/5/2023</a:t>
             </a:fld>
             <a:endParaRPr lang="en-US"/>
           </a:p>
@@ -8512,7 +8632,7 @@
           <a:p>
             <a:fld id="{54E435BD-4569-4C00-96FD-DE6EEAA430DA}" type="datetimeFigureOut">
               <a:rPr lang="en-US" smtClean="0"/>
-              <a:t>9/25/2023</a:t>
+              <a:t>10/5/2023</a:t>
             </a:fld>
             <a:endParaRPr lang="en-US"/>
           </a:p>
@@ -8682,7 +8802,7 @@
           <a:p>
             <a:fld id="{54E435BD-4569-4C00-96FD-DE6EEAA430DA}" type="datetimeFigureOut">
               <a:rPr lang="en-US" smtClean="0"/>
-              <a:t>9/25/2023</a:t>
+              <a:t>10/5/2023</a:t>
             </a:fld>
             <a:endParaRPr lang="en-US"/>
           </a:p>
@@ -8926,7 +9046,7 @@
           <a:p>
             <a:fld id="{54E435BD-4569-4C00-96FD-DE6EEAA430DA}" type="datetimeFigureOut">
               <a:rPr lang="en-US" smtClean="0"/>
-              <a:t>9/25/2023</a:t>
+              <a:t>10/5/2023</a:t>
             </a:fld>
             <a:endParaRPr lang="en-US"/>
           </a:p>
@@ -9158,7 +9278,7 @@
           <a:p>
             <a:fld id="{54E435BD-4569-4C00-96FD-DE6EEAA430DA}" type="datetimeFigureOut">
               <a:rPr lang="en-US" smtClean="0"/>
-              <a:t>9/25/2023</a:t>
+              <a:t>10/5/2023</a:t>
             </a:fld>
             <a:endParaRPr lang="en-US"/>
           </a:p>
@@ -9525,7 +9645,7 @@
           <a:p>
             <a:fld id="{54E435BD-4569-4C00-96FD-DE6EEAA430DA}" type="datetimeFigureOut">
               <a:rPr lang="en-US" smtClean="0"/>
-              <a:t>9/25/2023</a:t>
+              <a:t>10/5/2023</a:t>
             </a:fld>
             <a:endParaRPr lang="en-US"/>
           </a:p>
@@ -9643,7 +9763,7 @@
           <a:p>
             <a:fld id="{54E435BD-4569-4C00-96FD-DE6EEAA430DA}" type="datetimeFigureOut">
               <a:rPr lang="en-US" smtClean="0"/>
-              <a:t>9/25/2023</a:t>
+              <a:t>10/5/2023</a:t>
             </a:fld>
             <a:endParaRPr lang="en-US"/>
           </a:p>
@@ -9738,7 +9858,7 @@
           <a:p>
             <a:fld id="{54E435BD-4569-4C00-96FD-DE6EEAA430DA}" type="datetimeFigureOut">
               <a:rPr lang="en-US" smtClean="0"/>
-              <a:t>9/25/2023</a:t>
+              <a:t>10/5/2023</a:t>
             </a:fld>
             <a:endParaRPr lang="en-US"/>
           </a:p>
@@ -10015,7 +10135,7 @@
           <a:p>
             <a:fld id="{54E435BD-4569-4C00-96FD-DE6EEAA430DA}" type="datetimeFigureOut">
               <a:rPr lang="en-US" smtClean="0"/>
-              <a:t>9/25/2023</a:t>
+              <a:t>10/5/2023</a:t>
             </a:fld>
             <a:endParaRPr lang="en-US"/>
           </a:p>
@@ -10272,7 +10392,7 @@
           <a:p>
             <a:fld id="{54E435BD-4569-4C00-96FD-DE6EEAA430DA}" type="datetimeFigureOut">
               <a:rPr lang="en-US" smtClean="0"/>
-              <a:t>9/25/2023</a:t>
+              <a:t>10/5/2023</a:t>
             </a:fld>
             <a:endParaRPr lang="en-US"/>
           </a:p>
@@ -10485,7 +10605,7 @@
           <a:p>
             <a:fld id="{54E435BD-4569-4C00-96FD-DE6EEAA430DA}" type="datetimeFigureOut">
               <a:rPr lang="en-US" smtClean="0"/>
-              <a:t>9/25/2023</a:t>
+              <a:t>10/5/2023</a:t>
             </a:fld>
             <a:endParaRPr lang="en-US"/>
           </a:p>
@@ -13749,10 +13869,202 @@
           <a:chExt cx="0" cy="0"/>
         </a:xfrm>
       </p:grpSpPr>
+      <p:pic>
+        <p:nvPicPr>
+          <p:cNvPr id="7" name="Picture 6" descr="A graph with numbers and a number of data&#10;&#10;Description automatically generated with medium confidence">
+            <a:extLst>
+              <a:ext uri="{FF2B5EF4-FFF2-40B4-BE49-F238E27FC236}">
+                <a16:creationId xmlns:a16="http://schemas.microsoft.com/office/drawing/2014/main" id="{DC2A0D2E-27A3-F6E9-CED9-5056936258A6}"/>
+              </a:ext>
+            </a:extLst>
+          </p:cNvPr>
+          <p:cNvPicPr>
+            <a:picLocks noChangeAspect="1"/>
+          </p:cNvPicPr>
+          <p:nvPr/>
+        </p:nvPicPr>
+        <p:blipFill>
+          <a:blip r:embed="rId2">
+            <a:extLst>
+              <a:ext uri="{28A0092B-C50C-407E-A947-70E740481C1C}">
+                <a14:useLocalDpi xmlns:a14="http://schemas.microsoft.com/office/drawing/2010/main" val="0"/>
+              </a:ext>
+            </a:extLst>
+          </a:blip>
+          <a:stretch>
+            <a:fillRect/>
+          </a:stretch>
+        </p:blipFill>
+        <p:spPr>
+          <a:xfrm>
+            <a:off x="5714202" y="5714202"/>
+            <a:ext cx="11431595" cy="11431595"/>
+          </a:xfrm>
+          <a:prstGeom prst="rect">
+            <a:avLst/>
+          </a:prstGeom>
+        </p:spPr>
+      </p:pic>
     </p:spTree>
     <p:extLst>
       <p:ext uri="{BB962C8B-B14F-4D97-AF65-F5344CB8AC3E}">
         <p14:creationId xmlns:p14="http://schemas.microsoft.com/office/powerpoint/2010/main" val="3734765804"/>
+      </p:ext>
+    </p:extLst>
+  </p:cSld>
+  <p:clrMapOvr>
+    <a:masterClrMapping/>
+  </p:clrMapOvr>
+</p:sld>
+</file>
+
+<file path=ppt/slides/slide26.xml><?xml version="1.0" encoding="utf-8"?>
+<p:sld xmlns:a="http://schemas.openxmlformats.org/drawingml/2006/main" xmlns:r="http://schemas.openxmlformats.org/officeDocument/2006/relationships" xmlns:p="http://schemas.openxmlformats.org/presentationml/2006/main">
+  <p:cSld>
+    <p:spTree>
+      <p:nvGrpSpPr>
+        <p:cNvPr id="1" name=""/>
+        <p:cNvGrpSpPr/>
+        <p:nvPr/>
+      </p:nvGrpSpPr>
+      <p:grpSpPr>
+        <a:xfrm>
+          <a:off x="0" y="0"/>
+          <a:ext cx="0" cy="0"/>
+          <a:chOff x="0" y="0"/>
+          <a:chExt cx="0" cy="0"/>
+        </a:xfrm>
+      </p:grpSpPr>
+      <p:pic>
+        <p:nvPicPr>
+          <p:cNvPr id="3" name="Picture 2" descr="A chart with colorful lines and text&#10;&#10;Description automatically generated with medium confidence">
+            <a:extLst>
+              <a:ext uri="{FF2B5EF4-FFF2-40B4-BE49-F238E27FC236}">
+                <a16:creationId xmlns:a16="http://schemas.microsoft.com/office/drawing/2014/main" id="{59A03E0A-9FE4-004A-F62B-1A2BE7F6B001}"/>
+              </a:ext>
+            </a:extLst>
+          </p:cNvPr>
+          <p:cNvPicPr>
+            <a:picLocks noChangeAspect="1"/>
+          </p:cNvPicPr>
+          <p:nvPr/>
+        </p:nvPicPr>
+        <p:blipFill>
+          <a:blip r:embed="rId2">
+            <a:extLst>
+              <a:ext uri="{28A0092B-C50C-407E-A947-70E740481C1C}">
+                <a14:useLocalDpi xmlns:a14="http://schemas.microsoft.com/office/drawing/2010/main" val="0"/>
+              </a:ext>
+            </a:extLst>
+          </a:blip>
+          <a:stretch>
+            <a:fillRect/>
+          </a:stretch>
+        </p:blipFill>
+        <p:spPr>
+          <a:xfrm>
+            <a:off x="7619468" y="4475337"/>
+            <a:ext cx="7621064" cy="11431595"/>
+          </a:xfrm>
+          <a:prstGeom prst="rect">
+            <a:avLst/>
+          </a:prstGeom>
+        </p:spPr>
+      </p:pic>
+    </p:spTree>
+    <p:extLst>
+      <p:ext uri="{BB962C8B-B14F-4D97-AF65-F5344CB8AC3E}">
+        <p14:creationId xmlns:p14="http://schemas.microsoft.com/office/powerpoint/2010/main" val="2098746185"/>
+      </p:ext>
+    </p:extLst>
+  </p:cSld>
+  <p:clrMapOvr>
+    <a:masterClrMapping/>
+  </p:clrMapOvr>
+</p:sld>
+</file>
+
+<file path=ppt/slides/slide27.xml><?xml version="1.0" encoding="utf-8"?>
+<p:sld xmlns:a="http://schemas.openxmlformats.org/drawingml/2006/main" xmlns:r="http://schemas.openxmlformats.org/officeDocument/2006/relationships" xmlns:p="http://schemas.openxmlformats.org/presentationml/2006/main">
+  <p:cSld>
+    <p:spTree>
+      <p:nvGrpSpPr>
+        <p:cNvPr id="1" name=""/>
+        <p:cNvGrpSpPr/>
+        <p:nvPr/>
+      </p:nvGrpSpPr>
+      <p:grpSpPr>
+        <a:xfrm>
+          <a:off x="0" y="0"/>
+          <a:ext cx="0" cy="0"/>
+          <a:chOff x="0" y="0"/>
+          <a:chExt cx="0" cy="0"/>
+        </a:xfrm>
+      </p:grpSpPr>
+    </p:spTree>
+    <p:extLst>
+      <p:ext uri="{BB962C8B-B14F-4D97-AF65-F5344CB8AC3E}">
+        <p14:creationId xmlns:p14="http://schemas.microsoft.com/office/powerpoint/2010/main" val="3606136103"/>
+      </p:ext>
+    </p:extLst>
+  </p:cSld>
+  <p:clrMapOvr>
+    <a:masterClrMapping/>
+  </p:clrMapOvr>
+</p:sld>
+</file>
+
+<file path=ppt/slides/slide28.xml><?xml version="1.0" encoding="utf-8"?>
+<p:sld xmlns:a="http://schemas.openxmlformats.org/drawingml/2006/main" xmlns:r="http://schemas.openxmlformats.org/officeDocument/2006/relationships" xmlns:p="http://schemas.openxmlformats.org/presentationml/2006/main">
+  <p:cSld>
+    <p:spTree>
+      <p:nvGrpSpPr>
+        <p:cNvPr id="1" name=""/>
+        <p:cNvGrpSpPr/>
+        <p:nvPr/>
+      </p:nvGrpSpPr>
+      <p:grpSpPr>
+        <a:xfrm>
+          <a:off x="0" y="0"/>
+          <a:ext cx="0" cy="0"/>
+          <a:chOff x="0" y="0"/>
+          <a:chExt cx="0" cy="0"/>
+        </a:xfrm>
+      </p:grpSpPr>
+    </p:spTree>
+    <p:extLst>
+      <p:ext uri="{BB962C8B-B14F-4D97-AF65-F5344CB8AC3E}">
+        <p14:creationId xmlns:p14="http://schemas.microsoft.com/office/powerpoint/2010/main" val="2839755505"/>
+      </p:ext>
+    </p:extLst>
+  </p:cSld>
+  <p:clrMapOvr>
+    <a:masterClrMapping/>
+  </p:clrMapOvr>
+</p:sld>
+</file>
+
+<file path=ppt/slides/slide29.xml><?xml version="1.0" encoding="utf-8"?>
+<p:sld xmlns:a="http://schemas.openxmlformats.org/drawingml/2006/main" xmlns:r="http://schemas.openxmlformats.org/officeDocument/2006/relationships" xmlns:p="http://schemas.openxmlformats.org/presentationml/2006/main">
+  <p:cSld>
+    <p:spTree>
+      <p:nvGrpSpPr>
+        <p:cNvPr id="1" name=""/>
+        <p:cNvGrpSpPr/>
+        <p:nvPr/>
+      </p:nvGrpSpPr>
+      <p:grpSpPr>
+        <a:xfrm>
+          <a:off x="0" y="0"/>
+          <a:ext cx="0" cy="0"/>
+          <a:chOff x="0" y="0"/>
+          <a:chExt cx="0" cy="0"/>
+        </a:xfrm>
+      </p:grpSpPr>
+    </p:spTree>
+    <p:extLst>
+      <p:ext uri="{BB962C8B-B14F-4D97-AF65-F5344CB8AC3E}">
+        <p14:creationId xmlns:p14="http://schemas.microsoft.com/office/powerpoint/2010/main" val="3270000141"/>
       </p:ext>
     </p:extLst>
   </p:cSld>
@@ -19232,6 +19544,66 @@
 </p:sld>
 </file>
 
+<file path=ppt/slides/slide30.xml><?xml version="1.0" encoding="utf-8"?>
+<p:sld xmlns:a="http://schemas.openxmlformats.org/drawingml/2006/main" xmlns:r="http://schemas.openxmlformats.org/officeDocument/2006/relationships" xmlns:p="http://schemas.openxmlformats.org/presentationml/2006/main">
+  <p:cSld>
+    <p:spTree>
+      <p:nvGrpSpPr>
+        <p:cNvPr id="1" name=""/>
+        <p:cNvGrpSpPr/>
+        <p:nvPr/>
+      </p:nvGrpSpPr>
+      <p:grpSpPr>
+        <a:xfrm>
+          <a:off x="0" y="0"/>
+          <a:ext cx="0" cy="0"/>
+          <a:chOff x="0" y="0"/>
+          <a:chExt cx="0" cy="0"/>
+        </a:xfrm>
+      </p:grpSpPr>
+    </p:spTree>
+    <p:extLst>
+      <p:ext uri="{BB962C8B-B14F-4D97-AF65-F5344CB8AC3E}">
+        <p14:creationId xmlns:p14="http://schemas.microsoft.com/office/powerpoint/2010/main" val="1334374382"/>
+      </p:ext>
+    </p:extLst>
+  </p:cSld>
+  <p:clrMapOvr>
+    <a:masterClrMapping/>
+  </p:clrMapOvr>
+</p:sld>
+</file>
+
+<file path=ppt/slides/slide31.xml><?xml version="1.0" encoding="utf-8"?>
+<p:sld xmlns:a="http://schemas.openxmlformats.org/drawingml/2006/main" xmlns:r="http://schemas.openxmlformats.org/officeDocument/2006/relationships" xmlns:p="http://schemas.openxmlformats.org/presentationml/2006/main">
+  <p:cSld>
+    <p:spTree>
+      <p:nvGrpSpPr>
+        <p:cNvPr id="1" name=""/>
+        <p:cNvGrpSpPr/>
+        <p:nvPr/>
+      </p:nvGrpSpPr>
+      <p:grpSpPr>
+        <a:xfrm>
+          <a:off x="0" y="0"/>
+          <a:ext cx="0" cy="0"/>
+          <a:chOff x="0" y="0"/>
+          <a:chExt cx="0" cy="0"/>
+        </a:xfrm>
+      </p:grpSpPr>
+    </p:spTree>
+    <p:extLst>
+      <p:ext uri="{BB962C8B-B14F-4D97-AF65-F5344CB8AC3E}">
+        <p14:creationId xmlns:p14="http://schemas.microsoft.com/office/powerpoint/2010/main" val="603531214"/>
+      </p:ext>
+    </p:extLst>
+  </p:cSld>
+  <p:clrMapOvr>
+    <a:masterClrMapping/>
+  </p:clrMapOvr>
+</p:sld>
+</file>
+
 <file path=ppt/slides/slide4.xml><?xml version="1.0" encoding="utf-8"?>
 <p:sld xmlns:a="http://schemas.openxmlformats.org/drawingml/2006/main" xmlns:r="http://schemas.openxmlformats.org/officeDocument/2006/relationships" xmlns:p="http://schemas.openxmlformats.org/presentationml/2006/main">
   <p:cSld>
@@ -26085,10 +26457,10 @@
       </p:grpSpPr>
       <p:pic>
         <p:nvPicPr>
-          <p:cNvPr id="11" name="Picture 10" descr="A blue and red diagram&#10;&#10;Description automatically generated with medium confidence">
+          <p:cNvPr id="15" name="Picture 14" descr="A diagram of a blue box&#10;&#10;Description automatically generated with medium confidence">
             <a:extLst>
               <a:ext uri="{FF2B5EF4-FFF2-40B4-BE49-F238E27FC236}">
-                <a16:creationId xmlns:a16="http://schemas.microsoft.com/office/drawing/2014/main" id="{1025E53C-4161-BDC3-5C88-0F5EDD32E92E}"/>
+                <a16:creationId xmlns:a16="http://schemas.microsoft.com/office/drawing/2014/main" id="{15B7A2D7-94AC-3739-DF87-A6B2AB78F166}"/>
               </a:ext>
             </a:extLst>
           </p:cNvPr>
@@ -26111,7 +26483,7 @@
         </p:blipFill>
         <p:spPr>
           <a:xfrm>
-            <a:off x="0" y="6507092"/>
+            <a:off x="0" y="6563498"/>
             <a:ext cx="19052659" cy="8573696"/>
           </a:xfrm>
           <a:prstGeom prst="rect">

</xml_diff>

<commit_message>
Supplemental Figure 13, updates to Supplemental Tables 3 and 6
</commit_message>
<xml_diff>
--- a/Summary/figures.pptx
+++ b/Summary/figures.pptx
@@ -148,7 +148,7 @@
 <file path=ppt/revisionInfo.xml><?xml version="1.0" encoding="utf-8"?>
 <p1510:revInfo xmlns:a="http://schemas.openxmlformats.org/drawingml/2006/main" xmlns:r="http://schemas.openxmlformats.org/officeDocument/2006/relationships" xmlns:p1510="http://schemas.microsoft.com/office/powerpoint/2015/10/main">
   <p1510:revLst>
-    <p1510:client id="{833092D5-9927-4807-BE3E-672C10A7E002}" v="324" dt="2023-10-05T22:03:29.318"/>
+    <p1510:client id="{833092D5-9927-4807-BE3E-672C10A7E002}" v="329" dt="2023-10-10T23:09:31.254"/>
   </p1510:revLst>
 </p1510:revInfo>
 </file>
@@ -198,7 +198,7 @@
   <pc:docChgLst>
     <pc:chgData name="Jonathan Mah" userId="5261b2f2f3e51194" providerId="LiveId" clId="{833092D5-9927-4807-BE3E-672C10A7E002}"/>
     <pc:docChg chg="undo redo custSel addSld delSld modSld sldOrd">
-      <pc:chgData name="Jonathan Mah" userId="5261b2f2f3e51194" providerId="LiveId" clId="{833092D5-9927-4807-BE3E-672C10A7E002}" dt="2023-10-06T00:13:54.081" v="3749" actId="1076"/>
+      <pc:chgData name="Jonathan Mah" userId="5261b2f2f3e51194" providerId="LiveId" clId="{833092D5-9927-4807-BE3E-672C10A7E002}" dt="2023-10-10T23:09:47.238" v="3771" actId="1076"/>
       <pc:docMkLst>
         <pc:docMk/>
       </pc:docMkLst>
@@ -7100,12 +7100,68 @@
           </ac:picMkLst>
         </pc:picChg>
       </pc:sldChg>
-      <pc:sldChg chg="add">
-        <pc:chgData name="Jonathan Mah" userId="5261b2f2f3e51194" providerId="LiveId" clId="{833092D5-9927-4807-BE3E-672C10A7E002}" dt="2023-10-03T17:18:47.806" v="3704"/>
+      <pc:sldChg chg="addSp delSp modSp add mod">
+        <pc:chgData name="Jonathan Mah" userId="5261b2f2f3e51194" providerId="LiveId" clId="{833092D5-9927-4807-BE3E-672C10A7E002}" dt="2023-10-10T23:09:47.238" v="3771" actId="1076"/>
         <pc:sldMkLst>
           <pc:docMk/>
           <pc:sldMk cId="3606136103" sldId="457"/>
         </pc:sldMkLst>
+        <pc:spChg chg="add mod">
+          <ac:chgData name="Jonathan Mah" userId="5261b2f2f3e51194" providerId="LiveId" clId="{833092D5-9927-4807-BE3E-672C10A7E002}" dt="2023-10-10T23:05:06.468" v="3765" actId="1076"/>
+          <ac:spMkLst>
+            <pc:docMk/>
+            <pc:sldMk cId="3606136103" sldId="457"/>
+            <ac:spMk id="8" creationId="{E68AE7E9-3DBB-7A2C-0BFE-3A91A167C2E0}"/>
+          </ac:spMkLst>
+        </pc:spChg>
+        <pc:spChg chg="add mod">
+          <ac:chgData name="Jonathan Mah" userId="5261b2f2f3e51194" providerId="LiveId" clId="{833092D5-9927-4807-BE3E-672C10A7E002}" dt="2023-10-10T23:09:47.238" v="3771" actId="1076"/>
+          <ac:spMkLst>
+            <pc:docMk/>
+            <pc:sldMk cId="3606136103" sldId="457"/>
+            <ac:spMk id="9" creationId="{772DC352-0AA1-79F1-454D-797AE9BAEAD7}"/>
+          </ac:spMkLst>
+        </pc:spChg>
+        <pc:picChg chg="add del mod">
+          <ac:chgData name="Jonathan Mah" userId="5261b2f2f3e51194" providerId="LiveId" clId="{833092D5-9927-4807-BE3E-672C10A7E002}" dt="2023-10-10T23:09:23.156" v="3767" actId="478"/>
+          <ac:picMkLst>
+            <pc:docMk/>
+            <pc:sldMk cId="3606136103" sldId="457"/>
+            <ac:picMk id="3" creationId="{8819EA2C-741E-CD05-A98F-8160CE423D1A}"/>
+          </ac:picMkLst>
+        </pc:picChg>
+        <pc:picChg chg="add del mod">
+          <ac:chgData name="Jonathan Mah" userId="5261b2f2f3e51194" providerId="LiveId" clId="{833092D5-9927-4807-BE3E-672C10A7E002}" dt="2023-10-10T23:04:24.022" v="3757" actId="478"/>
+          <ac:picMkLst>
+            <pc:docMk/>
+            <pc:sldMk cId="3606136103" sldId="457"/>
+            <ac:picMk id="5" creationId="{0A97AEB8-5EB5-DD88-35C2-E091C9ACAC9C}"/>
+          </ac:picMkLst>
+        </pc:picChg>
+        <pc:picChg chg="add del mod modCrop">
+          <ac:chgData name="Jonathan Mah" userId="5261b2f2f3e51194" providerId="LiveId" clId="{833092D5-9927-4807-BE3E-672C10A7E002}" dt="2023-10-10T23:09:23.156" v="3767" actId="478"/>
+          <ac:picMkLst>
+            <pc:docMk/>
+            <pc:sldMk cId="3606136103" sldId="457"/>
+            <ac:picMk id="7" creationId="{F8D8AD3F-932C-74F5-9F6D-2D1E61D7E60B}"/>
+          </ac:picMkLst>
+        </pc:picChg>
+        <pc:picChg chg="add mod">
+          <ac:chgData name="Jonathan Mah" userId="5261b2f2f3e51194" providerId="LiveId" clId="{833092D5-9927-4807-BE3E-672C10A7E002}" dt="2023-10-10T23:09:37.465" v="3770" actId="1076"/>
+          <ac:picMkLst>
+            <pc:docMk/>
+            <pc:sldMk cId="3606136103" sldId="457"/>
+            <ac:picMk id="11" creationId="{2E6CD1F5-19E6-509E-D7AC-D081B70B0C04}"/>
+          </ac:picMkLst>
+        </pc:picChg>
+        <pc:picChg chg="add mod">
+          <ac:chgData name="Jonathan Mah" userId="5261b2f2f3e51194" providerId="LiveId" clId="{833092D5-9927-4807-BE3E-672C10A7E002}" dt="2023-10-10T23:09:33.387" v="3769" actId="1076"/>
+          <ac:picMkLst>
+            <pc:docMk/>
+            <pc:sldMk cId="3606136103" sldId="457"/>
+            <ac:picMk id="13" creationId="{62F1814D-7DA9-F9F7-A6F0-205FFB36D1F2}"/>
+          </ac:picMkLst>
+        </pc:picChg>
       </pc:sldChg>
       <pc:sldChg chg="add">
         <pc:chgData name="Jonathan Mah" userId="5261b2f2f3e51194" providerId="LiveId" clId="{833092D5-9927-4807-BE3E-672C10A7E002}" dt="2023-10-03T17:18:47.973" v="3705"/>
@@ -7222,7 +7278,7 @@
           <a:p>
             <a:fld id="{224F4B04-6A50-4A51-B675-D86EC6563060}" type="datetimeFigureOut">
               <a:rPr lang="en-US" smtClean="0"/>
-              <a:t>10/5/2023</a:t>
+              <a:t>10/10/2023</a:t>
             </a:fld>
             <a:endParaRPr lang="en-US"/>
           </a:p>
@@ -8282,7 +8338,7 @@
           <a:p>
             <a:fld id="{54E435BD-4569-4C00-96FD-DE6EEAA430DA}" type="datetimeFigureOut">
               <a:rPr lang="en-US" smtClean="0"/>
-              <a:t>10/5/2023</a:t>
+              <a:t>10/10/2023</a:t>
             </a:fld>
             <a:endParaRPr lang="en-US"/>
           </a:p>
@@ -8452,7 +8508,7 @@
           <a:p>
             <a:fld id="{54E435BD-4569-4C00-96FD-DE6EEAA430DA}" type="datetimeFigureOut">
               <a:rPr lang="en-US" smtClean="0"/>
-              <a:t>10/5/2023</a:t>
+              <a:t>10/10/2023</a:t>
             </a:fld>
             <a:endParaRPr lang="en-US"/>
           </a:p>
@@ -8632,7 +8688,7 @@
           <a:p>
             <a:fld id="{54E435BD-4569-4C00-96FD-DE6EEAA430DA}" type="datetimeFigureOut">
               <a:rPr lang="en-US" smtClean="0"/>
-              <a:t>10/5/2023</a:t>
+              <a:t>10/10/2023</a:t>
             </a:fld>
             <a:endParaRPr lang="en-US"/>
           </a:p>
@@ -8802,7 +8858,7 @@
           <a:p>
             <a:fld id="{54E435BD-4569-4C00-96FD-DE6EEAA430DA}" type="datetimeFigureOut">
               <a:rPr lang="en-US" smtClean="0"/>
-              <a:t>10/5/2023</a:t>
+              <a:t>10/10/2023</a:t>
             </a:fld>
             <a:endParaRPr lang="en-US"/>
           </a:p>
@@ -9046,7 +9102,7 @@
           <a:p>
             <a:fld id="{54E435BD-4569-4C00-96FD-DE6EEAA430DA}" type="datetimeFigureOut">
               <a:rPr lang="en-US" smtClean="0"/>
-              <a:t>10/5/2023</a:t>
+              <a:t>10/10/2023</a:t>
             </a:fld>
             <a:endParaRPr lang="en-US"/>
           </a:p>
@@ -9278,7 +9334,7 @@
           <a:p>
             <a:fld id="{54E435BD-4569-4C00-96FD-DE6EEAA430DA}" type="datetimeFigureOut">
               <a:rPr lang="en-US" smtClean="0"/>
-              <a:t>10/5/2023</a:t>
+              <a:t>10/10/2023</a:t>
             </a:fld>
             <a:endParaRPr lang="en-US"/>
           </a:p>
@@ -9645,7 +9701,7 @@
           <a:p>
             <a:fld id="{54E435BD-4569-4C00-96FD-DE6EEAA430DA}" type="datetimeFigureOut">
               <a:rPr lang="en-US" smtClean="0"/>
-              <a:t>10/5/2023</a:t>
+              <a:t>10/10/2023</a:t>
             </a:fld>
             <a:endParaRPr lang="en-US"/>
           </a:p>
@@ -9763,7 +9819,7 @@
           <a:p>
             <a:fld id="{54E435BD-4569-4C00-96FD-DE6EEAA430DA}" type="datetimeFigureOut">
               <a:rPr lang="en-US" smtClean="0"/>
-              <a:t>10/5/2023</a:t>
+              <a:t>10/10/2023</a:t>
             </a:fld>
             <a:endParaRPr lang="en-US"/>
           </a:p>
@@ -9858,7 +9914,7 @@
           <a:p>
             <a:fld id="{54E435BD-4569-4C00-96FD-DE6EEAA430DA}" type="datetimeFigureOut">
               <a:rPr lang="en-US" smtClean="0"/>
-              <a:t>10/5/2023</a:t>
+              <a:t>10/10/2023</a:t>
             </a:fld>
             <a:endParaRPr lang="en-US"/>
           </a:p>
@@ -10135,7 +10191,7 @@
           <a:p>
             <a:fld id="{54E435BD-4569-4C00-96FD-DE6EEAA430DA}" type="datetimeFigureOut">
               <a:rPr lang="en-US" smtClean="0"/>
-              <a:t>10/5/2023</a:t>
+              <a:t>10/10/2023</a:t>
             </a:fld>
             <a:endParaRPr lang="en-US"/>
           </a:p>
@@ -10392,7 +10448,7 @@
           <a:p>
             <a:fld id="{54E435BD-4569-4C00-96FD-DE6EEAA430DA}" type="datetimeFigureOut">
               <a:rPr lang="en-US" smtClean="0"/>
-              <a:t>10/5/2023</a:t>
+              <a:t>10/10/2023</a:t>
             </a:fld>
             <a:endParaRPr lang="en-US"/>
           </a:p>
@@ -10605,7 +10661,7 @@
           <a:p>
             <a:fld id="{54E435BD-4569-4C00-96FD-DE6EEAA430DA}" type="datetimeFigureOut">
               <a:rPr lang="en-US" smtClean="0"/>
-              <a:t>10/5/2023</a:t>
+              <a:t>10/10/2023</a:t>
             </a:fld>
             <a:endParaRPr lang="en-US"/>
           </a:p>
@@ -14001,6 +14057,156 @@
           <a:chExt cx="0" cy="0"/>
         </a:xfrm>
       </p:grpSpPr>
+      <p:sp>
+        <p:nvSpPr>
+          <p:cNvPr id="8" name="TextBox 7">
+            <a:extLst>
+              <a:ext uri="{FF2B5EF4-FFF2-40B4-BE49-F238E27FC236}">
+                <a16:creationId xmlns:a16="http://schemas.microsoft.com/office/drawing/2014/main" id="{E68AE7E9-3DBB-7A2C-0BFE-3A91A167C2E0}"/>
+              </a:ext>
+            </a:extLst>
+          </p:cNvPr>
+          <p:cNvSpPr txBox="1"/>
+          <p:nvPr/>
+        </p:nvSpPr>
+        <p:spPr>
+          <a:xfrm>
+            <a:off x="1147645" y="2588587"/>
+            <a:ext cx="712653" cy="553998"/>
+          </a:xfrm>
+          <a:prstGeom prst="rect">
+            <a:avLst/>
+          </a:prstGeom>
+          <a:noFill/>
+        </p:spPr>
+        <p:txBody>
+          <a:bodyPr wrap="square" rtlCol="0">
+            <a:spAutoFit/>
+          </a:bodyPr>
+          <a:lstStyle/>
+          <a:p>
+            <a:r>
+              <a:rPr lang="en-US" sz="3000" b="1" dirty="0">
+                <a:latin typeface="Arial" panose="020B0604020202020204" pitchFamily="34" charset="0"/>
+                <a:ea typeface="Yu Gothic" panose="020B0400000000000000" pitchFamily="34" charset="-128"/>
+                <a:cs typeface="Arial" panose="020B0604020202020204" pitchFamily="34" charset="0"/>
+              </a:rPr>
+              <a:t>A</a:t>
+            </a:r>
+          </a:p>
+        </p:txBody>
+      </p:sp>
+      <p:sp>
+        <p:nvSpPr>
+          <p:cNvPr id="9" name="TextBox 8">
+            <a:extLst>
+              <a:ext uri="{FF2B5EF4-FFF2-40B4-BE49-F238E27FC236}">
+                <a16:creationId xmlns:a16="http://schemas.microsoft.com/office/drawing/2014/main" id="{772DC352-0AA1-79F1-454D-797AE9BAEAD7}"/>
+              </a:ext>
+            </a:extLst>
+          </p:cNvPr>
+          <p:cNvSpPr txBox="1"/>
+          <p:nvPr/>
+        </p:nvSpPr>
+        <p:spPr>
+          <a:xfrm>
+            <a:off x="8768709" y="2588587"/>
+            <a:ext cx="712653" cy="553998"/>
+          </a:xfrm>
+          <a:prstGeom prst="rect">
+            <a:avLst/>
+          </a:prstGeom>
+          <a:noFill/>
+        </p:spPr>
+        <p:txBody>
+          <a:bodyPr wrap="square" rtlCol="0">
+            <a:spAutoFit/>
+          </a:bodyPr>
+          <a:lstStyle/>
+          <a:p>
+            <a:r>
+              <a:rPr lang="en-US" sz="3000" b="1" dirty="0">
+                <a:latin typeface="Arial" panose="020B0604020202020204" pitchFamily="34" charset="0"/>
+                <a:ea typeface="Yu Gothic" panose="020B0400000000000000" pitchFamily="34" charset="-128"/>
+                <a:cs typeface="Arial" panose="020B0604020202020204" pitchFamily="34" charset="0"/>
+              </a:rPr>
+              <a:t>B</a:t>
+            </a:r>
+          </a:p>
+        </p:txBody>
+      </p:sp>
+      <p:pic>
+        <p:nvPicPr>
+          <p:cNvPr id="11" name="Picture 10" descr="A graph with numbers and letters&#10;&#10;Description automatically generated with medium confidence">
+            <a:extLst>
+              <a:ext uri="{FF2B5EF4-FFF2-40B4-BE49-F238E27FC236}">
+                <a16:creationId xmlns:a16="http://schemas.microsoft.com/office/drawing/2014/main" id="{2E6CD1F5-19E6-509E-D7AC-D081B70B0C04}"/>
+              </a:ext>
+            </a:extLst>
+          </p:cNvPr>
+          <p:cNvPicPr>
+            <a:picLocks noChangeAspect="1"/>
+          </p:cNvPicPr>
+          <p:nvPr/>
+        </p:nvPicPr>
+        <p:blipFill>
+          <a:blip r:embed="rId2">
+            <a:extLst>
+              <a:ext uri="{28A0092B-C50C-407E-A947-70E740481C1C}">
+                <a14:useLocalDpi xmlns:a14="http://schemas.microsoft.com/office/drawing/2010/main" val="0"/>
+              </a:ext>
+            </a:extLst>
+          </a:blip>
+          <a:stretch>
+            <a:fillRect/>
+          </a:stretch>
+        </p:blipFill>
+        <p:spPr>
+          <a:xfrm>
+            <a:off x="8458790" y="3142585"/>
+            <a:ext cx="7621064" cy="7621064"/>
+          </a:xfrm>
+          <a:prstGeom prst="rect">
+            <a:avLst/>
+          </a:prstGeom>
+        </p:spPr>
+      </p:pic>
+      <p:pic>
+        <p:nvPicPr>
+          <p:cNvPr id="13" name="Picture 12" descr="A graph with numbers and letters&#10;&#10;Description automatically generated">
+            <a:extLst>
+              <a:ext uri="{FF2B5EF4-FFF2-40B4-BE49-F238E27FC236}">
+                <a16:creationId xmlns:a16="http://schemas.microsoft.com/office/drawing/2014/main" id="{62F1814D-7DA9-F9F7-A6F0-205FFB36D1F2}"/>
+              </a:ext>
+            </a:extLst>
+          </p:cNvPr>
+          <p:cNvPicPr>
+            <a:picLocks noChangeAspect="1"/>
+          </p:cNvPicPr>
+          <p:nvPr/>
+        </p:nvPicPr>
+        <p:blipFill>
+          <a:blip r:embed="rId3">
+            <a:extLst>
+              <a:ext uri="{28A0092B-C50C-407E-A947-70E740481C1C}">
+                <a14:useLocalDpi xmlns:a14="http://schemas.microsoft.com/office/drawing/2010/main" val="0"/>
+              </a:ext>
+            </a:extLst>
+          </a:blip>
+          <a:stretch>
+            <a:fillRect/>
+          </a:stretch>
+        </p:blipFill>
+        <p:spPr>
+          <a:xfrm>
+            <a:off x="837726" y="3142585"/>
+            <a:ext cx="7621064" cy="7621064"/>
+          </a:xfrm>
+          <a:prstGeom prst="rect">
+            <a:avLst/>
+          </a:prstGeom>
+        </p:spPr>
+      </p:pic>
     </p:spTree>
     <p:extLst>
       <p:ext uri="{BB962C8B-B14F-4D97-AF65-F5344CB8AC3E}">

</xml_diff>